<commit_message>
Predavanje 7 i 8
</commit_message>
<xml_diff>
--- a/06 Predavanje/RS2 - 06- Lesson- Security.pptx
+++ b/06 Predavanje/RS2 - 06- Lesson- Security.pptx
@@ -5,7 +5,7 @@
     <p:sldMasterId id="2147483648" r:id="rId1"/>
   </p:sldMasterIdLst>
   <p:notesMasterIdLst>
-    <p:notesMasterId r:id="rId27"/>
+    <p:notesMasterId r:id="rId28"/>
   </p:notesMasterIdLst>
   <p:sldIdLst>
     <p:sldId id="256" r:id="rId2"/>
@@ -24,15 +24,16 @@
     <p:sldId id="393" r:id="rId15"/>
     <p:sldId id="385" r:id="rId16"/>
     <p:sldId id="392" r:id="rId17"/>
-    <p:sldId id="384" r:id="rId18"/>
-    <p:sldId id="377" r:id="rId19"/>
-    <p:sldId id="391" r:id="rId20"/>
-    <p:sldId id="378" r:id="rId21"/>
-    <p:sldId id="380" r:id="rId22"/>
-    <p:sldId id="381" r:id="rId23"/>
-    <p:sldId id="382" r:id="rId24"/>
-    <p:sldId id="383" r:id="rId25"/>
-    <p:sldId id="386" r:id="rId26"/>
+    <p:sldId id="398" r:id="rId18"/>
+    <p:sldId id="384" r:id="rId19"/>
+    <p:sldId id="377" r:id="rId20"/>
+    <p:sldId id="391" r:id="rId21"/>
+    <p:sldId id="378" r:id="rId22"/>
+    <p:sldId id="380" r:id="rId23"/>
+    <p:sldId id="381" r:id="rId24"/>
+    <p:sldId id="382" r:id="rId25"/>
+    <p:sldId id="383" r:id="rId26"/>
+    <p:sldId id="386" r:id="rId27"/>
   </p:sldIdLst>
   <p:sldSz cx="12192000" cy="6858000"/>
   <p:notesSz cx="6858000" cy="9144000"/>
@@ -221,7 +222,7 @@
           <a:p>
             <a:fld id="{76D62D1A-510D-4D44-8A06-9D3CE1BC509B}" type="datetimeFigureOut">
               <a:rPr lang="en-US" smtClean="0"/>
-              <a:t>4/6/2019</a:t>
+              <a:t>4/10/2019</a:t>
             </a:fld>
             <a:endParaRPr lang="en-US"/>
           </a:p>
@@ -1679,7 +1680,7 @@
           <a:p>
             <a:fld id="{E5A51619-C51D-4723-B79E-0BEA894759E0}" type="datetimeFigureOut">
               <a:rPr lang="en-US" smtClean="0"/>
-              <a:t>4/6/2019</a:t>
+              <a:t>4/10/2019</a:t>
             </a:fld>
             <a:endParaRPr lang="en-US"/>
           </a:p>
@@ -1877,7 +1878,7 @@
           <a:p>
             <a:fld id="{E5A51619-C51D-4723-B79E-0BEA894759E0}" type="datetimeFigureOut">
               <a:rPr lang="en-US" smtClean="0"/>
-              <a:t>4/6/2019</a:t>
+              <a:t>4/10/2019</a:t>
             </a:fld>
             <a:endParaRPr lang="en-US"/>
           </a:p>
@@ -2085,7 +2086,7 @@
           <a:p>
             <a:fld id="{E5A51619-C51D-4723-B79E-0BEA894759E0}" type="datetimeFigureOut">
               <a:rPr lang="en-US" smtClean="0"/>
-              <a:t>4/6/2019</a:t>
+              <a:t>4/10/2019</a:t>
             </a:fld>
             <a:endParaRPr lang="en-US"/>
           </a:p>
@@ -2283,7 +2284,7 @@
           <a:p>
             <a:fld id="{E5A51619-C51D-4723-B79E-0BEA894759E0}" type="datetimeFigureOut">
               <a:rPr lang="en-US" smtClean="0"/>
-              <a:t>4/6/2019</a:t>
+              <a:t>4/10/2019</a:t>
             </a:fld>
             <a:endParaRPr lang="en-US"/>
           </a:p>
@@ -2558,7 +2559,7 @@
           <a:p>
             <a:fld id="{E5A51619-C51D-4723-B79E-0BEA894759E0}" type="datetimeFigureOut">
               <a:rPr lang="en-US" smtClean="0"/>
-              <a:t>4/6/2019</a:t>
+              <a:t>4/10/2019</a:t>
             </a:fld>
             <a:endParaRPr lang="en-US"/>
           </a:p>
@@ -2823,7 +2824,7 @@
           <a:p>
             <a:fld id="{E5A51619-C51D-4723-B79E-0BEA894759E0}" type="datetimeFigureOut">
               <a:rPr lang="en-US" smtClean="0"/>
-              <a:t>4/6/2019</a:t>
+              <a:t>4/10/2019</a:t>
             </a:fld>
             <a:endParaRPr lang="en-US"/>
           </a:p>
@@ -3235,7 +3236,7 @@
           <a:p>
             <a:fld id="{E5A51619-C51D-4723-B79E-0BEA894759E0}" type="datetimeFigureOut">
               <a:rPr lang="en-US" smtClean="0"/>
-              <a:t>4/6/2019</a:t>
+              <a:t>4/10/2019</a:t>
             </a:fld>
             <a:endParaRPr lang="en-US"/>
           </a:p>
@@ -3376,7 +3377,7 @@
           <a:p>
             <a:fld id="{E5A51619-C51D-4723-B79E-0BEA894759E0}" type="datetimeFigureOut">
               <a:rPr lang="en-US" smtClean="0"/>
-              <a:t>4/6/2019</a:t>
+              <a:t>4/10/2019</a:t>
             </a:fld>
             <a:endParaRPr lang="en-US"/>
           </a:p>
@@ -3489,7 +3490,7 @@
           <a:p>
             <a:fld id="{E5A51619-C51D-4723-B79E-0BEA894759E0}" type="datetimeFigureOut">
               <a:rPr lang="en-US" smtClean="0"/>
-              <a:t>4/6/2019</a:t>
+              <a:t>4/10/2019</a:t>
             </a:fld>
             <a:endParaRPr lang="en-US"/>
           </a:p>
@@ -3800,7 +3801,7 @@
           <a:p>
             <a:fld id="{E5A51619-C51D-4723-B79E-0BEA894759E0}" type="datetimeFigureOut">
               <a:rPr lang="en-US" smtClean="0"/>
-              <a:t>4/6/2019</a:t>
+              <a:t>4/10/2019</a:t>
             </a:fld>
             <a:endParaRPr lang="en-US"/>
           </a:p>
@@ -4088,7 +4089,7 @@
           <a:p>
             <a:fld id="{E5A51619-C51D-4723-B79E-0BEA894759E0}" type="datetimeFigureOut">
               <a:rPr lang="en-US" smtClean="0"/>
-              <a:t>4/6/2019</a:t>
+              <a:t>4/10/2019</a:t>
             </a:fld>
             <a:endParaRPr lang="en-US"/>
           </a:p>
@@ -4329,7 +4330,7 @@
           <a:p>
             <a:fld id="{E5A51619-C51D-4723-B79E-0BEA894759E0}" type="datetimeFigureOut">
               <a:rPr lang="en-US" smtClean="0"/>
-              <a:t>4/6/2019</a:t>
+              <a:t>4/10/2019</a:t>
             </a:fld>
             <a:endParaRPr lang="en-US"/>
           </a:p>
@@ -4768,18 +4769,9 @@
           <a:lstStyle/>
           <a:p>
             <a:r>
-              <a:rPr lang="bs-Latn-BA" dirty="0"/>
-              <a:t>Web API </a:t>
-            </a:r>
-            <a:r>
-              <a:rPr lang="bs-Latn-BA" dirty="0" err="1"/>
-              <a:t>Security</a:t>
-            </a:r>
-            <a:r>
-              <a:rPr lang="bs-Latn-BA" dirty="0"/>
-              <a:t> </a:t>
-            </a:r>
-            <a:endParaRPr lang="en-US" dirty="0"/>
+              <a:rPr lang="en-US" dirty="0"/>
+              <a:t>Web API Security </a:t>
+            </a:r>
           </a:p>
         </p:txBody>
       </p:sp>
@@ -7586,6 +7578,269 @@
       </p:grpSpPr>
       <p:sp>
         <p:nvSpPr>
+          <p:cNvPr id="2" name="Title 1">
+            <a:extLst>
+              <a:ext uri="{FF2B5EF4-FFF2-40B4-BE49-F238E27FC236}">
+                <a16:creationId xmlns:a16="http://schemas.microsoft.com/office/drawing/2014/main" id="{FCCE3462-7B51-4C97-8DA8-9AF7C679D56F}"/>
+              </a:ext>
+            </a:extLst>
+          </p:cNvPr>
+          <p:cNvSpPr>
+            <a:spLocks noGrp="1"/>
+          </p:cNvSpPr>
+          <p:nvPr>
+            <p:ph type="title"/>
+          </p:nvPr>
+        </p:nvSpPr>
+        <p:spPr/>
+        <p:txBody>
+          <a:bodyPr/>
+          <a:lstStyle/>
+          <a:p>
+            <a:r>
+              <a:rPr lang="bs-Latn-BA" dirty="0"/>
+              <a:t>Implementacije vlastite </a:t>
+            </a:r>
+            <a:r>
+              <a:rPr lang="bs-Latn-BA" dirty="0" err="1"/>
+              <a:t>Autentifikacije</a:t>
+            </a:r>
+            <a:endParaRPr lang="en-US" dirty="0"/>
+          </a:p>
+        </p:txBody>
+      </p:sp>
+      <p:sp>
+        <p:nvSpPr>
+          <p:cNvPr id="3" name="Content Placeholder 2">
+            <a:extLst>
+              <a:ext uri="{FF2B5EF4-FFF2-40B4-BE49-F238E27FC236}">
+                <a16:creationId xmlns:a16="http://schemas.microsoft.com/office/drawing/2014/main" id="{E87C8914-EBC3-476D-9171-BF763A5B976A}"/>
+              </a:ext>
+            </a:extLst>
+          </p:cNvPr>
+          <p:cNvSpPr>
+            <a:spLocks noGrp="1"/>
+          </p:cNvSpPr>
+          <p:nvPr>
+            <p:ph idx="1"/>
+          </p:nvPr>
+        </p:nvSpPr>
+        <p:spPr/>
+        <p:txBody>
+          <a:bodyPr/>
+          <a:lstStyle/>
+          <a:p>
+            <a:pPr algn="just"/>
+            <a:r>
+              <a:rPr lang="bs-Latn-BA" sz="2400" dirty="0" err="1"/>
+              <a:t>Autentifikaciju</a:t>
+            </a:r>
+            <a:r>
+              <a:rPr lang="bs-Latn-BA" sz="2400" dirty="0"/>
+              <a:t> je moguće implementirati kreiranjem vlastite klase (npr. </a:t>
+            </a:r>
+            <a:r>
+              <a:rPr lang="bs-Latn-BA" sz="2400" dirty="0" err="1">
+                <a:latin typeface="Courier New" panose="02070309020205020404" pitchFamily="49" charset="0"/>
+                <a:cs typeface="Courier New" panose="02070309020205020404" pitchFamily="49" charset="0"/>
+              </a:rPr>
+              <a:t>BasicAuthenticationHandler</a:t>
+            </a:r>
+            <a:r>
+              <a:rPr lang="bs-Latn-BA" sz="2400" dirty="0"/>
+              <a:t>), a tom prilikom je potrebno provesti sljedeće korake:</a:t>
+            </a:r>
+          </a:p>
+          <a:p>
+            <a:pPr lvl="1" algn="just"/>
+            <a:r>
+              <a:rPr lang="bs-Latn-BA" sz="2000" dirty="0" err="1"/>
+              <a:t>FitHandler</a:t>
+            </a:r>
+            <a:r>
+              <a:rPr lang="bs-Latn-BA" sz="2000" dirty="0"/>
+              <a:t> treba da naslijedi klasu </a:t>
+            </a:r>
+            <a:r>
+              <a:rPr lang="bs-Latn-BA" sz="2000" dirty="0" err="1">
+                <a:latin typeface="Courier New" panose="02070309020205020404" pitchFamily="49" charset="0"/>
+                <a:cs typeface="Courier New" panose="02070309020205020404" pitchFamily="49" charset="0"/>
+              </a:rPr>
+              <a:t>AuthenticationHandler</a:t>
+            </a:r>
+            <a:endParaRPr lang="bs-Latn-BA" sz="2000" dirty="0">
+              <a:latin typeface="Courier New" panose="02070309020205020404" pitchFamily="49" charset="0"/>
+              <a:cs typeface="Courier New" panose="02070309020205020404" pitchFamily="49" charset="0"/>
+            </a:endParaRPr>
+          </a:p>
+          <a:p>
+            <a:pPr lvl="1" algn="just"/>
+            <a:r>
+              <a:rPr lang="bs-Latn-BA" sz="2000" dirty="0"/>
+              <a:t>Implementira preklopljenu metodu </a:t>
+            </a:r>
+            <a:r>
+              <a:rPr lang="bs-Latn-BA" sz="2000" dirty="0" err="1">
+                <a:latin typeface="Courier New" panose="02070309020205020404" pitchFamily="49" charset="0"/>
+                <a:cs typeface="Courier New" panose="02070309020205020404" pitchFamily="49" charset="0"/>
+              </a:rPr>
+              <a:t>async</a:t>
+            </a:r>
+            <a:r>
+              <a:rPr lang="bs-Latn-BA" sz="2000" dirty="0">
+                <a:latin typeface="Courier New" panose="02070309020205020404" pitchFamily="49" charset="0"/>
+                <a:cs typeface="Courier New" panose="02070309020205020404" pitchFamily="49" charset="0"/>
+              </a:rPr>
+              <a:t> </a:t>
+            </a:r>
+            <a:r>
+              <a:rPr lang="bs-Latn-BA" sz="2000" dirty="0" err="1">
+                <a:latin typeface="Courier New" panose="02070309020205020404" pitchFamily="49" charset="0"/>
+                <a:cs typeface="Courier New" panose="02070309020205020404" pitchFamily="49" charset="0"/>
+              </a:rPr>
+              <a:t>Task</a:t>
+            </a:r>
+            <a:r>
+              <a:rPr lang="bs-Latn-BA" sz="2000" dirty="0">
+                <a:latin typeface="Courier New" panose="02070309020205020404" pitchFamily="49" charset="0"/>
+                <a:cs typeface="Courier New" panose="02070309020205020404" pitchFamily="49" charset="0"/>
+              </a:rPr>
+              <a:t>&lt;</a:t>
+            </a:r>
+            <a:r>
+              <a:rPr lang="bs-Latn-BA" sz="2000" dirty="0" err="1">
+                <a:latin typeface="Courier New" panose="02070309020205020404" pitchFamily="49" charset="0"/>
+                <a:cs typeface="Courier New" panose="02070309020205020404" pitchFamily="49" charset="0"/>
+              </a:rPr>
+              <a:t>AuthenticateResult</a:t>
+            </a:r>
+            <a:r>
+              <a:rPr lang="bs-Latn-BA" sz="2000" dirty="0">
+                <a:latin typeface="Courier New" panose="02070309020205020404" pitchFamily="49" charset="0"/>
+                <a:cs typeface="Courier New" panose="02070309020205020404" pitchFamily="49" charset="0"/>
+              </a:rPr>
+              <a:t>&gt; </a:t>
+            </a:r>
+            <a:r>
+              <a:rPr lang="bs-Latn-BA" sz="2000" dirty="0" err="1">
+                <a:latin typeface="Courier New" panose="02070309020205020404" pitchFamily="49" charset="0"/>
+                <a:cs typeface="Courier New" panose="02070309020205020404" pitchFamily="49" charset="0"/>
+              </a:rPr>
+              <a:t>HandleAuthenticateAsync</a:t>
+            </a:r>
+            <a:r>
+              <a:rPr lang="bs-Latn-BA" sz="2000" dirty="0">
+                <a:latin typeface="Courier New" panose="02070309020205020404" pitchFamily="49" charset="0"/>
+                <a:cs typeface="Courier New" panose="02070309020205020404" pitchFamily="49" charset="0"/>
+              </a:rPr>
+              <a:t>()</a:t>
+            </a:r>
+          </a:p>
+          <a:p>
+            <a:pPr lvl="1" algn="just"/>
+            <a:r>
+              <a:rPr lang="bs-Latn-BA" sz="2000" dirty="0"/>
+              <a:t>Unutar </a:t>
+            </a:r>
+            <a:r>
+              <a:rPr lang="bs-Latn-BA" sz="2000" dirty="0" err="1"/>
+              <a:t>SendAsync</a:t>
+            </a:r>
+            <a:r>
+              <a:rPr lang="bs-Latn-BA" sz="2000" dirty="0"/>
+              <a:t> metode se izvrši provjera pristupnih podataka koji su pristigli unutar zaglavlja </a:t>
+            </a:r>
+            <a:r>
+              <a:rPr lang="bs-Latn-BA" sz="2000" dirty="0" err="1">
+                <a:latin typeface="Courier New" panose="02070309020205020404" pitchFamily="49" charset="0"/>
+                <a:cs typeface="Courier New" panose="02070309020205020404" pitchFamily="49" charset="0"/>
+              </a:rPr>
+              <a:t>HttpRequest</a:t>
+            </a:r>
+            <a:r>
+              <a:rPr lang="bs-Latn-BA" sz="2000" dirty="0"/>
+              <a:t>-a</a:t>
+            </a:r>
+          </a:p>
+          <a:p>
+            <a:pPr lvl="1" algn="just"/>
+            <a:r>
+              <a:rPr lang="bs-Latn-BA" sz="2000" dirty="0"/>
+              <a:t>Ukoliko zaglavlje sadrži potrebne vrijednosti onda se za korisnika kreira odgovarajući </a:t>
+            </a:r>
+            <a:r>
+              <a:rPr lang="bs-Latn-BA" sz="2000" dirty="0" err="1">
+                <a:latin typeface="Courier New" panose="02070309020205020404" pitchFamily="49" charset="0"/>
+                <a:cs typeface="Courier New" panose="02070309020205020404" pitchFamily="49" charset="0"/>
+              </a:rPr>
+              <a:t>Identity</a:t>
+            </a:r>
+            <a:r>
+              <a:rPr lang="bs-Latn-BA" sz="2000" dirty="0"/>
+              <a:t> i </a:t>
+            </a:r>
+            <a:r>
+              <a:rPr lang="bs-Latn-BA" sz="2000" dirty="0">
+                <a:latin typeface="Courier New" panose="02070309020205020404" pitchFamily="49" charset="0"/>
+                <a:cs typeface="Courier New" panose="02070309020205020404" pitchFamily="49" charset="0"/>
+              </a:rPr>
+              <a:t>Principal </a:t>
+            </a:r>
+            <a:r>
+              <a:rPr lang="bs-Latn-BA" sz="2000" dirty="0">
+                <a:cs typeface="Calibri" panose="020F0502020204030204" pitchFamily="34" charset="0"/>
+              </a:rPr>
+              <a:t>i upakuje u </a:t>
+            </a:r>
+            <a:r>
+              <a:rPr lang="bs-Latn-BA" sz="2000" dirty="0" err="1">
+                <a:latin typeface="Courier New" panose="02070309020205020404" pitchFamily="49" charset="0"/>
+                <a:cs typeface="Courier New" panose="02070309020205020404" pitchFamily="49" charset="0"/>
+              </a:rPr>
+              <a:t>AuthenticationTicket</a:t>
+            </a:r>
+            <a:endParaRPr lang="bs-Latn-BA" sz="1800" dirty="0">
+              <a:latin typeface="Courier New" panose="02070309020205020404" pitchFamily="49" charset="0"/>
+              <a:cs typeface="Courier New" panose="02070309020205020404" pitchFamily="49" charset="0"/>
+            </a:endParaRPr>
+          </a:p>
+          <a:p>
+            <a:endParaRPr lang="en-US" dirty="0"/>
+          </a:p>
+        </p:txBody>
+      </p:sp>
+    </p:spTree>
+    <p:extLst>
+      <p:ext uri="{BB962C8B-B14F-4D97-AF65-F5344CB8AC3E}">
+        <p14:creationId xmlns:p14="http://schemas.microsoft.com/office/powerpoint/2010/main" val="4111462701"/>
+      </p:ext>
+    </p:extLst>
+  </p:cSld>
+  <p:clrMapOvr>
+    <a:masterClrMapping/>
+  </p:clrMapOvr>
+</p:sld>
+</file>
+
+<file path=ppt/slides/slide18.xml><?xml version="1.0" encoding="utf-8"?>
+<p:sld xmlns:a="http://schemas.openxmlformats.org/drawingml/2006/main" xmlns:r="http://schemas.openxmlformats.org/officeDocument/2006/relationships" xmlns:p="http://schemas.openxmlformats.org/presentationml/2006/main">
+  <p:cSld>
+    <p:spTree>
+      <p:nvGrpSpPr>
+        <p:cNvPr id="1" name=""/>
+        <p:cNvGrpSpPr/>
+        <p:nvPr/>
+      </p:nvGrpSpPr>
+      <p:grpSpPr>
+        <a:xfrm>
+          <a:off x="0" y="0"/>
+          <a:ext cx="0" cy="0"/>
+          <a:chOff x="0" y="0"/>
+          <a:chExt cx="0" cy="0"/>
+        </a:xfrm>
+      </p:grpSpPr>
+      <p:sp>
+        <p:nvSpPr>
           <p:cNvPr id="13" name="Text Box 4"/>
           <p:cNvSpPr txBox="1">
             <a:spLocks noChangeArrowheads="1"/>
@@ -8025,7 +8280,7 @@
 </p:sld>
 </file>
 
-<file path=ppt/slides/slide18.xml><?xml version="1.0" encoding="utf-8"?>
+<file path=ppt/slides/slide19.xml><?xml version="1.0" encoding="utf-8"?>
 <p:sld xmlns:a="http://schemas.openxmlformats.org/drawingml/2006/main" xmlns:r="http://schemas.openxmlformats.org/officeDocument/2006/relationships" xmlns:p="http://schemas.openxmlformats.org/presentationml/2006/main">
   <p:cSld>
     <p:spTree>
@@ -9132,7 +9387,149 @@
 </p:sld>
 </file>
 
-<file path=ppt/slides/slide19.xml><?xml version="1.0" encoding="utf-8"?>
+<file path=ppt/slides/slide2.xml><?xml version="1.0" encoding="utf-8"?>
+<p:sld xmlns:a="http://schemas.openxmlformats.org/drawingml/2006/main" xmlns:r="http://schemas.openxmlformats.org/officeDocument/2006/relationships" xmlns:p="http://schemas.openxmlformats.org/presentationml/2006/main">
+  <p:cSld>
+    <p:spTree>
+      <p:nvGrpSpPr>
+        <p:cNvPr id="1" name=""/>
+        <p:cNvGrpSpPr/>
+        <p:nvPr/>
+      </p:nvGrpSpPr>
+      <p:grpSpPr>
+        <a:xfrm>
+          <a:off x="0" y="0"/>
+          <a:ext cx="0" cy="0"/>
+          <a:chOff x="0" y="0"/>
+          <a:chExt cx="0" cy="0"/>
+        </a:xfrm>
+      </p:grpSpPr>
+      <p:sp>
+        <p:nvSpPr>
+          <p:cNvPr id="2" name="Title 1">
+            <a:extLst>
+              <a:ext uri="{FF2B5EF4-FFF2-40B4-BE49-F238E27FC236}">
+                <a16:creationId xmlns:a16="http://schemas.microsoft.com/office/drawing/2014/main" id="{45F84A32-B8FE-49C8-8D9B-B70445FEBAD7}"/>
+              </a:ext>
+            </a:extLst>
+          </p:cNvPr>
+          <p:cNvSpPr>
+            <a:spLocks noGrp="1"/>
+          </p:cNvSpPr>
+          <p:nvPr>
+            <p:ph type="title"/>
+          </p:nvPr>
+        </p:nvSpPr>
+        <p:spPr/>
+        <p:txBody>
+          <a:bodyPr/>
+          <a:lstStyle/>
+          <a:p>
+            <a:r>
+              <a:rPr lang="bs-Latn-BA" dirty="0"/>
+              <a:t>Sadržaj</a:t>
+            </a:r>
+            <a:endParaRPr lang="en-US" dirty="0"/>
+          </a:p>
+        </p:txBody>
+      </p:sp>
+      <p:sp>
+        <p:nvSpPr>
+          <p:cNvPr id="3" name="Content Placeholder 2">
+            <a:extLst>
+              <a:ext uri="{FF2B5EF4-FFF2-40B4-BE49-F238E27FC236}">
+                <a16:creationId xmlns:a16="http://schemas.microsoft.com/office/drawing/2014/main" id="{B3A36805-2D20-4C1F-9EA5-5491439E680E}"/>
+              </a:ext>
+            </a:extLst>
+          </p:cNvPr>
+          <p:cNvSpPr>
+            <a:spLocks noGrp="1"/>
+          </p:cNvSpPr>
+          <p:nvPr>
+            <p:ph idx="1"/>
+          </p:nvPr>
+        </p:nvSpPr>
+        <p:spPr/>
+        <p:txBody>
+          <a:bodyPr/>
+          <a:lstStyle/>
+          <a:p>
+            <a:r>
+              <a:rPr lang="bs-Latn-BA" dirty="0"/>
+              <a:t>HTTPS</a:t>
+            </a:r>
+          </a:p>
+          <a:p>
+            <a:r>
+              <a:rPr lang="bs-Latn-BA" dirty="0" err="1"/>
+              <a:t>Autentifikacija</a:t>
+            </a:r>
+            <a:endParaRPr lang="bs-Latn-BA" dirty="0"/>
+          </a:p>
+          <a:p>
+            <a:r>
+              <a:rPr lang="bs-Latn-BA" dirty="0"/>
+              <a:t>Autorizacija</a:t>
+            </a:r>
+          </a:p>
+          <a:p>
+            <a:r>
+              <a:rPr lang="bs-Latn-BA" dirty="0" err="1"/>
+              <a:t>Token</a:t>
+            </a:r>
+            <a:r>
+              <a:rPr lang="bs-Latn-BA" dirty="0"/>
+              <a:t> bazirana </a:t>
+            </a:r>
+            <a:r>
+              <a:rPr lang="bs-Latn-BA" dirty="0" err="1"/>
+              <a:t>autentikacija</a:t>
+            </a:r>
+            <a:endParaRPr lang="bs-Latn-BA" dirty="0"/>
+          </a:p>
+          <a:p>
+            <a:r>
+              <a:rPr lang="bs-Latn-BA" dirty="0"/>
+              <a:t>JSON Web </a:t>
+            </a:r>
+            <a:r>
+              <a:rPr lang="bs-Latn-BA" dirty="0" err="1"/>
+              <a:t>Token</a:t>
+            </a:r>
+            <a:endParaRPr lang="bs-Latn-BA" dirty="0"/>
+          </a:p>
+          <a:p>
+            <a:r>
+              <a:rPr lang="bs-Latn-BA" dirty="0" err="1"/>
+              <a:t>OAuth</a:t>
+            </a:r>
+            <a:endParaRPr lang="bs-Latn-BA" dirty="0"/>
+          </a:p>
+          <a:p>
+            <a:r>
+              <a:rPr lang="bs-Latn-BA" dirty="0"/>
+              <a:t>Zaštita podataka</a:t>
+            </a:r>
+          </a:p>
+          <a:p>
+            <a:endParaRPr lang="en-US" dirty="0"/>
+          </a:p>
+        </p:txBody>
+      </p:sp>
+    </p:spTree>
+    <p:extLst>
+      <p:ext uri="{BB962C8B-B14F-4D97-AF65-F5344CB8AC3E}">
+        <p14:creationId xmlns:p14="http://schemas.microsoft.com/office/powerpoint/2010/main" val="4056618627"/>
+      </p:ext>
+    </p:extLst>
+  </p:cSld>
+  <p:clrMapOvr>
+    <a:masterClrMapping/>
+  </p:clrMapOvr>
+</p:sld>
+</file>
+
+<file path=ppt/slides/slide20.xml><?xml version="1.0" encoding="utf-8"?>
 <p:sld xmlns:a="http://schemas.openxmlformats.org/drawingml/2006/main" xmlns:r="http://schemas.openxmlformats.org/officeDocument/2006/relationships" xmlns:p="http://schemas.openxmlformats.org/presentationml/2006/main">
   <p:cSld>
     <p:spTree>
@@ -9238,149 +9635,7 @@
 </p:sld>
 </file>
 
-<file path=ppt/slides/slide2.xml><?xml version="1.0" encoding="utf-8"?>
-<p:sld xmlns:a="http://schemas.openxmlformats.org/drawingml/2006/main" xmlns:r="http://schemas.openxmlformats.org/officeDocument/2006/relationships" xmlns:p="http://schemas.openxmlformats.org/presentationml/2006/main">
-  <p:cSld>
-    <p:spTree>
-      <p:nvGrpSpPr>
-        <p:cNvPr id="1" name=""/>
-        <p:cNvGrpSpPr/>
-        <p:nvPr/>
-      </p:nvGrpSpPr>
-      <p:grpSpPr>
-        <a:xfrm>
-          <a:off x="0" y="0"/>
-          <a:ext cx="0" cy="0"/>
-          <a:chOff x="0" y="0"/>
-          <a:chExt cx="0" cy="0"/>
-        </a:xfrm>
-      </p:grpSpPr>
-      <p:sp>
-        <p:nvSpPr>
-          <p:cNvPr id="2" name="Title 1">
-            <a:extLst>
-              <a:ext uri="{FF2B5EF4-FFF2-40B4-BE49-F238E27FC236}">
-                <a16:creationId xmlns:a16="http://schemas.microsoft.com/office/drawing/2014/main" id="{45F84A32-B8FE-49C8-8D9B-B70445FEBAD7}"/>
-              </a:ext>
-            </a:extLst>
-          </p:cNvPr>
-          <p:cNvSpPr>
-            <a:spLocks noGrp="1"/>
-          </p:cNvSpPr>
-          <p:nvPr>
-            <p:ph type="title"/>
-          </p:nvPr>
-        </p:nvSpPr>
-        <p:spPr/>
-        <p:txBody>
-          <a:bodyPr/>
-          <a:lstStyle/>
-          <a:p>
-            <a:r>
-              <a:rPr lang="bs-Latn-BA" dirty="0"/>
-              <a:t>Sadržaj</a:t>
-            </a:r>
-            <a:endParaRPr lang="en-US" dirty="0"/>
-          </a:p>
-        </p:txBody>
-      </p:sp>
-      <p:sp>
-        <p:nvSpPr>
-          <p:cNvPr id="3" name="Content Placeholder 2">
-            <a:extLst>
-              <a:ext uri="{FF2B5EF4-FFF2-40B4-BE49-F238E27FC236}">
-                <a16:creationId xmlns:a16="http://schemas.microsoft.com/office/drawing/2014/main" id="{B3A36805-2D20-4C1F-9EA5-5491439E680E}"/>
-              </a:ext>
-            </a:extLst>
-          </p:cNvPr>
-          <p:cNvSpPr>
-            <a:spLocks noGrp="1"/>
-          </p:cNvSpPr>
-          <p:nvPr>
-            <p:ph idx="1"/>
-          </p:nvPr>
-        </p:nvSpPr>
-        <p:spPr/>
-        <p:txBody>
-          <a:bodyPr/>
-          <a:lstStyle/>
-          <a:p>
-            <a:r>
-              <a:rPr lang="bs-Latn-BA" dirty="0"/>
-              <a:t>HTTPS</a:t>
-            </a:r>
-          </a:p>
-          <a:p>
-            <a:r>
-              <a:rPr lang="bs-Latn-BA" dirty="0" err="1"/>
-              <a:t>Autentifikacija</a:t>
-            </a:r>
-            <a:endParaRPr lang="bs-Latn-BA" dirty="0"/>
-          </a:p>
-          <a:p>
-            <a:r>
-              <a:rPr lang="bs-Latn-BA" dirty="0"/>
-              <a:t>Autorizacija</a:t>
-            </a:r>
-          </a:p>
-          <a:p>
-            <a:r>
-              <a:rPr lang="bs-Latn-BA" dirty="0" err="1"/>
-              <a:t>Token</a:t>
-            </a:r>
-            <a:r>
-              <a:rPr lang="bs-Latn-BA" dirty="0"/>
-              <a:t> bazirana </a:t>
-            </a:r>
-            <a:r>
-              <a:rPr lang="bs-Latn-BA" dirty="0" err="1"/>
-              <a:t>autentikacija</a:t>
-            </a:r>
-            <a:endParaRPr lang="bs-Latn-BA" dirty="0"/>
-          </a:p>
-          <a:p>
-            <a:r>
-              <a:rPr lang="bs-Latn-BA" dirty="0"/>
-              <a:t>JSON Web </a:t>
-            </a:r>
-            <a:r>
-              <a:rPr lang="bs-Latn-BA" dirty="0" err="1"/>
-              <a:t>Token</a:t>
-            </a:r>
-            <a:endParaRPr lang="bs-Latn-BA" dirty="0"/>
-          </a:p>
-          <a:p>
-            <a:r>
-              <a:rPr lang="bs-Latn-BA" dirty="0" err="1"/>
-              <a:t>OAuth</a:t>
-            </a:r>
-            <a:endParaRPr lang="bs-Latn-BA" dirty="0"/>
-          </a:p>
-          <a:p>
-            <a:r>
-              <a:rPr lang="bs-Latn-BA" dirty="0"/>
-              <a:t>Zaštita podataka</a:t>
-            </a:r>
-          </a:p>
-          <a:p>
-            <a:endParaRPr lang="en-US" dirty="0"/>
-          </a:p>
-        </p:txBody>
-      </p:sp>
-    </p:spTree>
-    <p:extLst>
-      <p:ext uri="{BB962C8B-B14F-4D97-AF65-F5344CB8AC3E}">
-        <p14:creationId xmlns:p14="http://schemas.microsoft.com/office/powerpoint/2010/main" val="4056618627"/>
-      </p:ext>
-    </p:extLst>
-  </p:cSld>
-  <p:clrMapOvr>
-    <a:masterClrMapping/>
-  </p:clrMapOvr>
-</p:sld>
-</file>
-
-<file path=ppt/slides/slide20.xml><?xml version="1.0" encoding="utf-8"?>
+<file path=ppt/slides/slide21.xml><?xml version="1.0" encoding="utf-8"?>
 <p:sld xmlns:a="http://schemas.openxmlformats.org/drawingml/2006/main" xmlns:r="http://schemas.openxmlformats.org/officeDocument/2006/relationships" xmlns:p="http://schemas.openxmlformats.org/presentationml/2006/main">
   <p:cSld>
     <p:spTree>
@@ -9877,7 +10132,7 @@
 </p:sld>
 </file>
 
-<file path=ppt/slides/slide21.xml><?xml version="1.0" encoding="utf-8"?>
+<file path=ppt/slides/slide22.xml><?xml version="1.0" encoding="utf-8"?>
 <p:sld xmlns:a="http://schemas.openxmlformats.org/drawingml/2006/main" xmlns:r="http://schemas.openxmlformats.org/officeDocument/2006/relationships" xmlns:p="http://schemas.openxmlformats.org/presentationml/2006/main">
   <p:cSld>
     <p:spTree>
@@ -10543,7 +10798,7 @@
 </p:sld>
 </file>
 
-<file path=ppt/slides/slide22.xml><?xml version="1.0" encoding="utf-8"?>
+<file path=ppt/slides/slide23.xml><?xml version="1.0" encoding="utf-8"?>
 <p:sld xmlns:a="http://schemas.openxmlformats.org/drawingml/2006/main" xmlns:r="http://schemas.openxmlformats.org/officeDocument/2006/relationships" xmlns:p="http://schemas.openxmlformats.org/presentationml/2006/main">
   <p:cSld>
     <p:spTree>
@@ -10995,7 +11250,7 @@
 </p:sld>
 </file>
 
-<file path=ppt/slides/slide23.xml><?xml version="1.0" encoding="utf-8"?>
+<file path=ppt/slides/slide24.xml><?xml version="1.0" encoding="utf-8"?>
 <p:sld xmlns:a="http://schemas.openxmlformats.org/drawingml/2006/main" xmlns:r="http://schemas.openxmlformats.org/officeDocument/2006/relationships" xmlns:p="http://schemas.openxmlformats.org/presentationml/2006/main">
   <p:cSld>
     <p:spTree>
@@ -11580,7 +11835,7 @@
 </p:sld>
 </file>
 
-<file path=ppt/slides/slide24.xml><?xml version="1.0" encoding="utf-8"?>
+<file path=ppt/slides/slide25.xml><?xml version="1.0" encoding="utf-8"?>
 <p:sld xmlns:a="http://schemas.openxmlformats.org/drawingml/2006/main" xmlns:r="http://schemas.openxmlformats.org/officeDocument/2006/relationships" xmlns:p="http://schemas.openxmlformats.org/presentationml/2006/main">
   <p:cSld>
     <p:spTree>
@@ -12815,7 +13070,7 @@
 </p:sld>
 </file>
 
-<file path=ppt/slides/slide25.xml><?xml version="1.0" encoding="utf-8"?>
+<file path=ppt/slides/slide26.xml><?xml version="1.0" encoding="utf-8"?>
 <p:sld xmlns:a="http://schemas.openxmlformats.org/drawingml/2006/main" xmlns:r="http://schemas.openxmlformats.org/officeDocument/2006/relationships" xmlns:p="http://schemas.openxmlformats.org/presentationml/2006/main">
   <p:cSld>
     <p:spTree>

</xml_diff>